<commit_message>
Strong + soft + weak + phantom references
</commit_message>
<xml_diff>
--- a/Presentations/08 - Design Patterns - References.pptx
+++ b/Presentations/08 - Design Patterns - References.pptx
@@ -11,10 +11,10 @@
     <p:sldMasterId id="2147483720" r:id="rId7"/>
   </p:sldMasterIdLst>
   <p:notesMasterIdLst>
-    <p:notesMasterId r:id="rId50"/>
+    <p:notesMasterId r:id="rId51"/>
   </p:notesMasterIdLst>
   <p:handoutMasterIdLst>
-    <p:handoutMasterId r:id="rId51"/>
+    <p:handoutMasterId r:id="rId52"/>
   </p:handoutMasterIdLst>
   <p:sldIdLst>
     <p:sldId id="256" r:id="rId8"/>
@@ -59,6 +59,7 @@
     <p:sldId id="296" r:id="rId47"/>
     <p:sldId id="297" r:id="rId48"/>
     <p:sldId id="298" r:id="rId49"/>
+    <p:sldId id="299" r:id="rId50"/>
   </p:sldIdLst>
   <p:sldSz cx="12193588" cy="6858000"/>
   <p:notesSz cx="6858000" cy="9144000"/>
@@ -3494,6 +3495,81 @@
     <p:extLst>
       <p:ext uri="{BB962C8B-B14F-4D97-AF65-F5344CB8AC3E}">
         <p14:creationId xmlns:p14="http://schemas.microsoft.com/office/powerpoint/2010/main" val="2442279251"/>
+      </p:ext>
+    </p:extLst>
+  </p:cSld>
+  <p:clrMapOvr>
+    <a:masterClrMapping/>
+  </p:clrMapOvr>
+</p:notes>
+</file>
+
+<file path=ppt/notesSlides/notesSlide43.xml><?xml version="1.0" encoding="utf-8"?>
+<p:notes xmlns:a="http://schemas.openxmlformats.org/drawingml/2006/main" xmlns:r="http://schemas.openxmlformats.org/officeDocument/2006/relationships" xmlns:p="http://schemas.openxmlformats.org/presentationml/2006/main">
+  <p:cSld>
+    <p:spTree>
+      <p:nvGrpSpPr>
+        <p:cNvPr id="1" name=""/>
+        <p:cNvGrpSpPr/>
+        <p:nvPr/>
+      </p:nvGrpSpPr>
+      <p:grpSpPr>
+        <a:xfrm>
+          <a:off x="0" y="0"/>
+          <a:ext cx="0" cy="0"/>
+          <a:chOff x="0" y="0"/>
+          <a:chExt cx="0" cy="0"/>
+        </a:xfrm>
+      </p:grpSpPr>
+      <p:sp>
+        <p:nvSpPr>
+          <p:cNvPr id="2" name="Slide Image Placeholder 1"/>
+          <p:cNvSpPr>
+            <a:spLocks noGrp="1" noRot="1" noChangeAspect="1" noResize="1"/>
+          </p:cNvSpPr>
+          <p:nvPr>
+            <p:ph type="sldImg"/>
+          </p:nvPr>
+        </p:nvSpPr>
+        <p:spPr>
+          <a:xfrm>
+            <a:off x="382588" y="695325"/>
+            <a:ext cx="6092825" cy="3427413"/>
+          </a:xfrm>
+          <a:solidFill>
+            <a:srgbClr val="729FCF"/>
+          </a:solidFill>
+          <a:ln w="25400">
+            <a:solidFill>
+              <a:srgbClr val="3465A4"/>
+            </a:solidFill>
+            <a:prstDash val="solid"/>
+          </a:ln>
+        </p:spPr>
+      </p:sp>
+      <p:sp>
+        <p:nvSpPr>
+          <p:cNvPr id="3" name="Notes Placeholder 2"/>
+          <p:cNvSpPr txBox="1">
+            <a:spLocks noGrp="1"/>
+          </p:cNvSpPr>
+          <p:nvPr>
+            <p:ph type="body" sz="quarter" idx="1"/>
+          </p:nvPr>
+        </p:nvSpPr>
+        <p:spPr/>
+        <p:txBody>
+          <a:bodyPr/>
+          <a:lstStyle/>
+          <a:p>
+            <a:endParaRPr lang="en-US"/>
+          </a:p>
+        </p:txBody>
+      </p:sp>
+    </p:spTree>
+    <p:extLst>
+      <p:ext uri="{BB962C8B-B14F-4D97-AF65-F5344CB8AC3E}">
+        <p14:creationId xmlns:p14="http://schemas.microsoft.com/office/powerpoint/2010/main" val="1911832743"/>
       </p:ext>
     </p:extLst>
   </p:cSld>
@@ -25502,16 +25578,7 @@
                 </a:solidFill>
                 <a:latin typeface="Century Gothic" panose="020B0502020202020204" pitchFamily="34" charset="0"/>
               </a:rPr>
-              <a:t>9</a:t>
-            </a:r>
-            <a:r>
-              <a:rPr lang="en-US" sz="2000" dirty="0" smtClean="0">
-                <a:solidFill>
-                  <a:schemeClr val="bg1"/>
-                </a:solidFill>
-                <a:latin typeface="Century Gothic" panose="020B0502020202020204" pitchFamily="34" charset="0"/>
-              </a:rPr>
-              <a:t>.5.2019</a:t>
+              <a:t>9.5.2019</a:t>
             </a:r>
             <a:endParaRPr lang="en-US" sz="2000" dirty="0">
               <a:solidFill>
@@ -26785,11 +26852,6 @@
               </a:rPr>
               <a:t>); </a:t>
             </a:r>
-            <a:endParaRPr lang="en-US" sz="3600" dirty="0">
-              <a:solidFill>
-                <a:schemeClr val="bg1"/>
-              </a:solidFill>
-            </a:endParaRPr>
           </a:p>
           <a:p>
             <a:pPr marL="571500" indent="-571500">
@@ -27901,11 +27963,7 @@
             </a:r>
             <a:r>
               <a:rPr lang="en-US" sz="3600" b="1" dirty="0" err="1" smtClean="0"/>
-              <a:t>j</a:t>
-            </a:r>
-            <a:r>
-              <a:rPr lang="en-US" sz="3600" b="1" dirty="0" err="1" smtClean="0"/>
-              <a:t>ava.lang.ref</a:t>
+              <a:t>java.lang.ref</a:t>
             </a:r>
             <a:endParaRPr lang="sk-SK" sz="3600" b="1" dirty="0"/>
           </a:p>
@@ -34185,6 +34243,14 @@
               <a:t>	</a:t>
             </a:r>
             <a:r>
+              <a:rPr lang="en-US" sz="3200" dirty="0">
+                <a:solidFill>
+                  <a:schemeClr val="bg1"/>
+                </a:solidFill>
+              </a:rPr>
+              <a:t>instance, </a:t>
+            </a:r>
+            <a:r>
               <a:rPr lang="sk-SK" sz="3200" i="1" dirty="0" smtClean="0">
                 <a:solidFill>
                   <a:schemeClr val="bg1"/>
@@ -34591,6 +34657,14 @@
               <a:t>	</a:t>
             </a:r>
             <a:r>
+              <a:rPr lang="en-US" sz="3200" dirty="0">
+                <a:solidFill>
+                  <a:schemeClr val="bg1"/>
+                </a:solidFill>
+              </a:rPr>
+              <a:t>instance, </a:t>
+            </a:r>
+            <a:r>
               <a:rPr lang="sk-SK" sz="3200" i="1" dirty="0" smtClean="0">
                 <a:solidFill>
                   <a:schemeClr val="bg1"/>
@@ -35042,6 +35116,14 @@
               <a:t>	</a:t>
             </a:r>
             <a:r>
+              <a:rPr lang="en-US" sz="3200" dirty="0" smtClean="0">
+                <a:solidFill>
+                  <a:schemeClr val="bg1"/>
+                </a:solidFill>
+              </a:rPr>
+              <a:t>instance, </a:t>
+            </a:r>
+            <a:r>
               <a:rPr lang="sk-SK" sz="3200" i="1" dirty="0" smtClean="0">
                 <a:solidFill>
                   <a:schemeClr val="bg1"/>
@@ -36121,7 +36203,7 @@
         <p:spPr>
           <a:xfrm>
             <a:off x="189571" y="1133595"/>
-            <a:ext cx="12004017" cy="5078313"/>
+            <a:ext cx="12004017" cy="2492990"/>
           </a:xfrm>
           <a:prstGeom prst="rect">
             <a:avLst/>
@@ -36135,7 +36217,7 @@
           <a:lstStyle/>
           <a:p>
             <a:r>
-              <a:rPr lang="en-US" sz="3200" dirty="0" smtClean="0">
+              <a:rPr lang="en-US" sz="2800" dirty="0" smtClean="0">
                 <a:solidFill>
                   <a:schemeClr val="accent2"/>
                 </a:solidFill>
@@ -36143,7 +36225,7 @@
               <a:t>How can we deal </a:t>
             </a:r>
             <a:r>
-              <a:rPr lang="en-US" sz="3200" dirty="0">
+              <a:rPr lang="en-US" sz="2800" dirty="0">
                 <a:solidFill>
                   <a:schemeClr val="accent2"/>
                 </a:solidFill>
@@ -36151,7 +36233,7 @@
               <a:t>with lapsed listeners (observers</a:t>
             </a:r>
             <a:r>
-              <a:rPr lang="en-US" sz="3200" dirty="0" smtClean="0">
+              <a:rPr lang="en-US" sz="2800" dirty="0" smtClean="0">
                 <a:solidFill>
                   <a:schemeClr val="accent2"/>
                 </a:solidFill>
@@ -36160,7 +36242,7 @@
             </a:r>
           </a:p>
           <a:p>
-            <a:endParaRPr lang="en-US" sz="1200" dirty="0" smtClean="0">
+            <a:endParaRPr lang="en-US" sz="800" dirty="0" smtClean="0">
               <a:solidFill>
                 <a:schemeClr val="accent2"/>
               </a:solidFill>
@@ -36172,7 +36254,7 @@
               <a:buChar char="•"/>
             </a:pPr>
             <a:r>
-              <a:rPr lang="en-US" sz="3200" i="1" dirty="0">
+              <a:rPr lang="en-US" sz="2800" i="1" dirty="0">
                 <a:solidFill>
                   <a:schemeClr val="bg1"/>
                 </a:solidFill>
@@ -36180,7 +36262,7 @@
               <a:t>Always unregister your listeners unless they are interested in receiving notifications</a:t>
             </a:r>
             <a:r>
-              <a:rPr lang="en-US" sz="3200" i="1" dirty="0" smtClean="0">
+              <a:rPr lang="en-US" sz="2800" i="1" dirty="0" smtClean="0">
                 <a:solidFill>
                   <a:schemeClr val="bg1"/>
                 </a:solidFill>
@@ -36190,7 +36272,7 @@
           </a:p>
           <a:p>
             <a:pPr lvl="1"/>
-            <a:endParaRPr lang="en-US" sz="1200" i="1" dirty="0" smtClean="0">
+            <a:endParaRPr lang="en-US" sz="800" i="1" dirty="0" smtClean="0">
               <a:solidFill>
                 <a:schemeClr val="bg1"/>
               </a:solidFill>
@@ -36199,70 +36281,344 @@
           <a:p>
             <a:pPr lvl="1"/>
             <a:r>
-              <a:rPr lang="en-US" sz="3200" i="1" dirty="0" smtClean="0">
+              <a:rPr lang="en-US" sz="2800" i="1" dirty="0" smtClean="0">
                 <a:solidFill>
                   <a:schemeClr val="bg1"/>
                 </a:solidFill>
               </a:rPr>
               <a:t>and/or</a:t>
             </a:r>
+          </a:p>
+          <a:p>
+            <a:pPr marL="914400" lvl="1" indent="-457200">
+              <a:buFont typeface="Arial" panose="020B0604020202020204" pitchFamily="34" charset="0"/>
+              <a:buChar char="•"/>
+            </a:pPr>
+            <a:r>
+              <a:rPr lang="en-US" sz="2800" i="1" dirty="0" smtClean="0">
+                <a:solidFill>
+                  <a:schemeClr val="bg1"/>
+                </a:solidFill>
+              </a:rPr>
+              <a:t>Check if observers </a:t>
+            </a:r>
+            <a:r>
+              <a:rPr lang="en-US" sz="2800" i="1" dirty="0" smtClean="0">
+                <a:solidFill>
+                  <a:schemeClr val="bg1"/>
+                </a:solidFill>
+              </a:rPr>
+              <a:t>are still </a:t>
+            </a:r>
+            <a:r>
+              <a:rPr lang="en-US" sz="2800" i="1" dirty="0" smtClean="0">
+                <a:solidFill>
+                  <a:schemeClr val="bg1"/>
+                </a:solidFill>
+              </a:rPr>
+              <a:t>active (push vs. pull</a:t>
+            </a:r>
+            <a:r>
+              <a:rPr lang="en-US" sz="2800" i="1" dirty="0" smtClean="0">
+                <a:solidFill>
+                  <a:schemeClr val="bg1"/>
+                </a:solidFill>
+              </a:rPr>
+              <a:t>)</a:t>
+            </a:r>
+            <a:endParaRPr lang="en-US" sz="2800" i="1" dirty="0">
+              <a:solidFill>
+                <a:schemeClr val="bg1"/>
+              </a:solidFill>
+            </a:endParaRPr>
+          </a:p>
+        </p:txBody>
+      </p:sp>
+    </p:spTree>
+    <p:extLst>
+      <p:ext uri="{BB962C8B-B14F-4D97-AF65-F5344CB8AC3E}">
+        <p14:creationId xmlns:p14="http://schemas.microsoft.com/office/powerpoint/2010/main" val="2862999676"/>
+      </p:ext>
+    </p:extLst>
+  </p:cSld>
+  <p:clrMapOvr>
+    <a:masterClrMapping/>
+  </p:clrMapOvr>
+  <p:timing>
+    <p:tnLst>
+      <p:par>
+        <p:cTn id="1" dur="indefinite" restart="never" nodeType="tmRoot"/>
+      </p:par>
+    </p:tnLst>
+  </p:timing>
+</p:sld>
+</file>
+
+<file path=ppt/slides/slide43.xml><?xml version="1.0" encoding="utf-8"?>
+<p:sld xmlns:a="http://schemas.openxmlformats.org/drawingml/2006/main" xmlns:r="http://schemas.openxmlformats.org/officeDocument/2006/relationships" xmlns:p="http://schemas.openxmlformats.org/presentationml/2006/main">
+  <p:cSld>
+    <p:spTree>
+      <p:nvGrpSpPr>
+        <p:cNvPr id="1" name=""/>
+        <p:cNvGrpSpPr/>
+        <p:nvPr/>
+      </p:nvGrpSpPr>
+      <p:grpSpPr>
+        <a:xfrm>
+          <a:off x="0" y="0"/>
+          <a:ext cx="0" cy="0"/>
+          <a:chOff x="0" y="0"/>
+          <a:chExt cx="0" cy="0"/>
+        </a:xfrm>
+      </p:grpSpPr>
+      <p:sp>
+        <p:nvSpPr>
+          <p:cNvPr id="4" name="Title 1"/>
+          <p:cNvSpPr txBox="1">
+            <a:spLocks/>
+          </p:cNvSpPr>
+          <p:nvPr/>
+        </p:nvSpPr>
+        <p:spPr>
+          <a:xfrm>
+            <a:off x="3504720" y="0"/>
+            <a:ext cx="8557971" cy="951346"/>
+          </a:xfrm>
+          <a:prstGeom prst="rect">
+            <a:avLst/>
+          </a:prstGeom>
+          <a:noFill/>
+          <a:ln>
+            <a:noFill/>
+          </a:ln>
+        </p:spPr>
+        <p:txBody>
+          <a:bodyPr vert="horz" wrap="square" lIns="91440" tIns="45720" rIns="91440" bIns="45720" anchor="ctr" anchorCtr="0" compatLnSpc="1">
+            <a:noAutofit/>
+          </a:bodyPr>
+          <a:lstStyle>
+            <a:lvl1pPr marL="0" marR="0" indent="0" algn="r" rtl="0" hangingPunct="0">
+              <a:lnSpc>
+                <a:spcPct val="90000"/>
+              </a:lnSpc>
+              <a:spcBef>
+                <a:spcPts val="0"/>
+              </a:spcBef>
+              <a:spcAft>
+                <a:spcPts val="0"/>
+              </a:spcAft>
+              <a:tabLst>
+                <a:tab pos="0" algn="l"/>
+                <a:tab pos="914400" algn="l"/>
+                <a:tab pos="1828800" algn="l"/>
+                <a:tab pos="2743199" algn="l"/>
+                <a:tab pos="3657600" algn="l"/>
+                <a:tab pos="4572000" algn="l"/>
+                <a:tab pos="5486399" algn="l"/>
+                <a:tab pos="6400799" algn="l"/>
+                <a:tab pos="7315200" algn="l"/>
+                <a:tab pos="8229600" algn="l"/>
+                <a:tab pos="9144000" algn="l"/>
+                <a:tab pos="10058400" algn="l"/>
+              </a:tabLst>
+              <a:defRPr lang="en-US" sz="4000" b="0" i="0" u="none" strike="noStrike" cap="none" baseline="0">
+                <a:ln>
+                  <a:noFill/>
+                </a:ln>
+                <a:solidFill>
+                  <a:srgbClr val="FFFFFF"/>
+                </a:solidFill>
+                <a:highlight>
+                  <a:scrgbClr r="0" g="0" b="0">
+                    <a:alpha val="0"/>
+                  </a:scrgbClr>
+                </a:highlight>
+                <a:latin typeface="Century Gothic" pitchFamily="34"/>
+              </a:defRPr>
+            </a:lvl1pPr>
+          </a:lstStyle>
+          <a:p>
+            <a:pPr hangingPunct="1"/>
+            <a:r>
+              <a:rPr lang="en-US" sz="3600" b="1" kern="0" dirty="0" smtClean="0">
+                <a:solidFill>
+                  <a:schemeClr val="accent2"/>
+                </a:solidFill>
+              </a:rPr>
+              <a:t>Recap</a:t>
+            </a:r>
+            <a:endParaRPr lang="sk-SK" sz="3600" b="1" kern="0" dirty="0">
+              <a:solidFill>
+                <a:schemeClr val="accent2"/>
+              </a:solidFill>
+            </a:endParaRPr>
+          </a:p>
+        </p:txBody>
+      </p:sp>
+      <p:sp>
+        <p:nvSpPr>
+          <p:cNvPr id="6" name="TextBox 5"/>
+          <p:cNvSpPr txBox="1"/>
+          <p:nvPr/>
+        </p:nvSpPr>
+        <p:spPr>
+          <a:xfrm>
+            <a:off x="189571" y="1133595"/>
+            <a:ext cx="12004017" cy="5201424"/>
+          </a:xfrm>
+          <a:prstGeom prst="rect">
+            <a:avLst/>
+          </a:prstGeom>
+          <a:noFill/>
+        </p:spPr>
+        <p:txBody>
+          <a:bodyPr wrap="square" rtlCol="0">
+            <a:spAutoFit/>
+          </a:bodyPr>
+          <a:lstStyle/>
+          <a:p>
+            <a:r>
+              <a:rPr lang="en-US" sz="2800" dirty="0" smtClean="0">
+                <a:solidFill>
+                  <a:schemeClr val="accent2"/>
+                </a:solidFill>
+              </a:rPr>
+              <a:t>How can we deal </a:t>
+            </a:r>
+            <a:r>
+              <a:rPr lang="en-US" sz="2800" dirty="0">
+                <a:solidFill>
+                  <a:schemeClr val="accent2"/>
+                </a:solidFill>
+              </a:rPr>
+              <a:t>with lapsed listeners (observers</a:t>
+            </a:r>
+            <a:r>
+              <a:rPr lang="en-US" sz="2800" dirty="0" smtClean="0">
+                <a:solidFill>
+                  <a:schemeClr val="accent2"/>
+                </a:solidFill>
+              </a:rPr>
+              <a:t>)?</a:t>
+            </a:r>
+          </a:p>
+          <a:p>
+            <a:endParaRPr lang="en-US" sz="800" dirty="0" smtClean="0">
+              <a:solidFill>
+                <a:schemeClr val="accent2"/>
+              </a:solidFill>
+            </a:endParaRPr>
           </a:p>
           <a:p>
             <a:pPr marL="971550" lvl="1" indent="-514350">
               <a:buFont typeface="Arial" panose="020B0604020202020204" pitchFamily="34" charset="0"/>
               <a:buChar char="•"/>
             </a:pPr>
-            <a:endParaRPr lang="en-US" sz="1200" i="1" dirty="0" smtClean="0">
+            <a:r>
+              <a:rPr lang="en-US" sz="2800" i="1" dirty="0">
+                <a:solidFill>
+                  <a:schemeClr val="bg1"/>
+                </a:solidFill>
+              </a:rPr>
+              <a:t>Always unregister your listeners unless they are interested in receiving notifications</a:t>
+            </a:r>
+            <a:r>
+              <a:rPr lang="en-US" sz="2800" i="1" dirty="0" smtClean="0">
+                <a:solidFill>
+                  <a:schemeClr val="bg1"/>
+                </a:solidFill>
+              </a:rPr>
+              <a:t>.</a:t>
+            </a:r>
+          </a:p>
+          <a:p>
+            <a:pPr lvl="1"/>
+            <a:endParaRPr lang="en-US" sz="800" i="1" dirty="0" smtClean="0">
               <a:solidFill>
                 <a:schemeClr val="bg1"/>
               </a:solidFill>
             </a:endParaRPr>
           </a:p>
           <a:p>
+            <a:pPr lvl="1"/>
+            <a:r>
+              <a:rPr lang="en-US" sz="2800" i="1" dirty="0" smtClean="0">
+                <a:solidFill>
+                  <a:schemeClr val="bg1"/>
+                </a:solidFill>
+              </a:rPr>
+              <a:t>and/or</a:t>
+            </a:r>
+          </a:p>
+          <a:p>
+            <a:pPr marL="914400" lvl="1" indent="-457200">
+              <a:buFont typeface="Arial" panose="020B0604020202020204" pitchFamily="34" charset="0"/>
+              <a:buChar char="•"/>
+            </a:pPr>
+            <a:r>
+              <a:rPr lang="en-US" sz="2800" i="1" dirty="0" smtClean="0">
+                <a:solidFill>
+                  <a:schemeClr val="bg1"/>
+                </a:solidFill>
+              </a:rPr>
+              <a:t>Check if observers </a:t>
+            </a:r>
+            <a:r>
+              <a:rPr lang="en-US" sz="2800" i="1" smtClean="0">
+                <a:solidFill>
+                  <a:schemeClr val="bg1"/>
+                </a:solidFill>
+              </a:rPr>
+              <a:t>are </a:t>
+            </a:r>
+            <a:r>
+              <a:rPr lang="en-US" sz="2800" i="1" smtClean="0">
+                <a:solidFill>
+                  <a:schemeClr val="bg1"/>
+                </a:solidFill>
+              </a:rPr>
+              <a:t>still active </a:t>
+            </a:r>
+            <a:r>
+              <a:rPr lang="en-US" sz="2800" i="1" dirty="0" smtClean="0">
+                <a:solidFill>
+                  <a:schemeClr val="bg1"/>
+                </a:solidFill>
+              </a:rPr>
+              <a:t>(push vs. pull)</a:t>
+            </a:r>
+            <a:endParaRPr lang="en-US" sz="2800" i="1" dirty="0">
+              <a:solidFill>
+                <a:schemeClr val="bg1"/>
+              </a:solidFill>
+            </a:endParaRPr>
+          </a:p>
+          <a:p>
+            <a:pPr lvl="1"/>
+            <a:r>
+              <a:rPr lang="en-US" sz="2800" i="1" dirty="0" smtClean="0">
+                <a:solidFill>
+                  <a:schemeClr val="bg1"/>
+                </a:solidFill>
+              </a:rPr>
+              <a:t>and/or</a:t>
+            </a:r>
+            <a:endParaRPr lang="en-US" sz="2800" i="1" dirty="0">
+              <a:solidFill>
+                <a:schemeClr val="bg1"/>
+              </a:solidFill>
+            </a:endParaRPr>
+          </a:p>
+          <a:p>
             <a:pPr marL="971550" lvl="1" indent="-514350">
               <a:buFont typeface="Arial" panose="020B0604020202020204" pitchFamily="34" charset="0"/>
               <a:buChar char="•"/>
             </a:pPr>
-            <a:r>
-              <a:rPr lang="en-US" sz="3200" i="1" dirty="0" smtClean="0">
-                <a:solidFill>
-                  <a:schemeClr val="bg1"/>
-                </a:solidFill>
-              </a:rPr>
-              <a:t>Use weak </a:t>
-            </a:r>
-            <a:r>
-              <a:rPr lang="en-US" sz="3200" i="1" dirty="0">
-                <a:solidFill>
-                  <a:schemeClr val="bg1"/>
-                </a:solidFill>
-              </a:rPr>
-              <a:t>r</a:t>
-            </a:r>
-            <a:r>
-              <a:rPr lang="en-US" sz="3200" i="1" dirty="0" smtClean="0">
-                <a:solidFill>
-                  <a:schemeClr val="bg1"/>
-                </a:solidFill>
-              </a:rPr>
-              <a:t>eferences  </a:t>
-            </a:r>
-            <a:r>
-              <a:rPr lang="en-US" sz="3200" i="1" dirty="0">
-                <a:solidFill>
-                  <a:schemeClr val="bg1"/>
-                </a:solidFill>
-              </a:rPr>
-              <a:t>to keep track of registered observers</a:t>
-            </a:r>
-            <a:r>
-              <a:rPr lang="en-US" sz="3200" i="1" dirty="0" smtClean="0">
-                <a:solidFill>
-                  <a:schemeClr val="bg1"/>
-                </a:solidFill>
-              </a:rPr>
-              <a:t>.</a:t>
-            </a:r>
+            <a:endParaRPr lang="en-US" sz="800" i="1" dirty="0" smtClean="0">
+              <a:solidFill>
+                <a:schemeClr val="bg1"/>
+              </a:solidFill>
+            </a:endParaRPr>
           </a:p>
           <a:p>
             <a:pPr marL="971550" lvl="1" indent="-514350">
@@ -36270,44 +36626,44 @@
               <a:buChar char="•"/>
             </a:pPr>
             <a:r>
-              <a:rPr lang="en-US" sz="3200" i="1" dirty="0" smtClean="0">
-                <a:solidFill>
-                  <a:schemeClr val="bg1"/>
-                </a:solidFill>
-              </a:rPr>
-              <a:t>Find </a:t>
-            </a:r>
-            <a:r>
-              <a:rPr lang="en-US" sz="3200" i="1" dirty="0">
-                <a:solidFill>
-                  <a:schemeClr val="bg1"/>
-                </a:solidFill>
-              </a:rPr>
-              <a:t>an object that has the same lifecycle as the observers and </a:t>
-            </a:r>
-            <a:r>
-              <a:rPr lang="en-US" sz="3200" i="1" dirty="0" smtClean="0">
-                <a:solidFill>
-                  <a:schemeClr val="bg1"/>
-                </a:solidFill>
-              </a:rPr>
-              <a:t>hold </a:t>
-            </a:r>
-            <a:r>
-              <a:rPr lang="en-US" sz="3200" i="1" dirty="0">
-                <a:solidFill>
-                  <a:schemeClr val="bg1"/>
-                </a:solidFill>
-              </a:rPr>
-              <a:t>a strong reference to the </a:t>
-            </a:r>
-            <a:r>
-              <a:rPr lang="en-US" sz="3200" i="1" dirty="0" smtClean="0">
-                <a:solidFill>
-                  <a:schemeClr val="bg1"/>
-                </a:solidFill>
-              </a:rPr>
-              <a:t>observer within it</a:t>
+              <a:rPr lang="en-US" sz="2800" i="1" dirty="0" smtClean="0">
+                <a:solidFill>
+                  <a:schemeClr val="bg1"/>
+                </a:solidFill>
+              </a:rPr>
+              <a:t>Use weak </a:t>
+            </a:r>
+            <a:r>
+              <a:rPr lang="en-US" sz="2800" i="1" dirty="0">
+                <a:solidFill>
+                  <a:schemeClr val="bg1"/>
+                </a:solidFill>
+              </a:rPr>
+              <a:t>r</a:t>
+            </a:r>
+            <a:r>
+              <a:rPr lang="en-US" sz="2800" i="1" dirty="0" smtClean="0">
+                <a:solidFill>
+                  <a:schemeClr val="bg1"/>
+                </a:solidFill>
+              </a:rPr>
+              <a:t>eferences  </a:t>
+            </a:r>
+            <a:r>
+              <a:rPr lang="en-US" sz="2800" i="1" dirty="0">
+                <a:solidFill>
+                  <a:schemeClr val="bg1"/>
+                </a:solidFill>
+              </a:rPr>
+              <a:t>to keep track of registered observers</a:t>
+            </a:r>
+            <a:r>
+              <a:rPr lang="en-US" sz="2800" i="1" dirty="0" smtClean="0">
+                <a:solidFill>
+                  <a:schemeClr val="bg1"/>
+                </a:solidFill>
+              </a:rPr>
+              <a:t>.</a:t>
             </a:r>
           </a:p>
           <a:p>
@@ -36316,7 +36672,53 @@
               <a:buChar char="•"/>
             </a:pPr>
             <a:r>
-              <a:rPr lang="en-US" sz="3200" i="1" dirty="0">
+              <a:rPr lang="en-US" sz="2800" i="1" dirty="0" smtClean="0">
+                <a:solidFill>
+                  <a:schemeClr val="bg1"/>
+                </a:solidFill>
+              </a:rPr>
+              <a:t>Find </a:t>
+            </a:r>
+            <a:r>
+              <a:rPr lang="en-US" sz="2800" i="1" dirty="0">
+                <a:solidFill>
+                  <a:schemeClr val="bg1"/>
+                </a:solidFill>
+              </a:rPr>
+              <a:t>an object that has the same lifecycle as the observers and </a:t>
+            </a:r>
+            <a:r>
+              <a:rPr lang="en-US" sz="2800" i="1" dirty="0" smtClean="0">
+                <a:solidFill>
+                  <a:schemeClr val="bg1"/>
+                </a:solidFill>
+              </a:rPr>
+              <a:t>hold </a:t>
+            </a:r>
+            <a:r>
+              <a:rPr lang="en-US" sz="2800" i="1" dirty="0">
+                <a:solidFill>
+                  <a:schemeClr val="bg1"/>
+                </a:solidFill>
+              </a:rPr>
+              <a:t>a strong reference to the </a:t>
+            </a:r>
+            <a:r>
+              <a:rPr lang="en-US" sz="2800" i="1" dirty="0" smtClean="0">
+                <a:solidFill>
+                  <a:schemeClr val="bg1"/>
+                </a:solidFill>
+              </a:rPr>
+              <a:t>observer within it</a:t>
+            </a:r>
+          </a:p>
+          <a:p>
+            <a:pPr marL="971550" lvl="1" indent="-514350">
+              <a:buFont typeface="Arial" panose="020B0604020202020204" pitchFamily="34" charset="0"/>
+              <a:buChar char="•"/>
+            </a:pPr>
+            <a:r>
+              <a:rPr lang="en-US" sz="2800" i="1" dirty="0">
                 <a:solidFill>
                   <a:schemeClr val="bg1"/>
                 </a:solidFill>
@@ -36324,14 +36726,14 @@
               <a:t>Consider if </a:t>
             </a:r>
             <a:r>
-              <a:rPr lang="en-US" sz="3200" i="1" dirty="0" smtClean="0">
+              <a:rPr lang="en-US" sz="2800" i="1" dirty="0" smtClean="0">
                 <a:solidFill>
                   <a:schemeClr val="bg1"/>
                 </a:solidFill>
               </a:rPr>
               <a:t>you need to store observers in a  thread-safe implementation of List</a:t>
             </a:r>
-            <a:endParaRPr lang="en-US" sz="3200" i="1" dirty="0">
+            <a:endParaRPr lang="en-US" sz="2800" i="1" dirty="0">
               <a:solidFill>
                 <a:schemeClr val="bg1"/>
               </a:solidFill>
@@ -36342,7 +36744,7 @@
     </p:spTree>
     <p:extLst>
       <p:ext uri="{BB962C8B-B14F-4D97-AF65-F5344CB8AC3E}">
-        <p14:creationId xmlns:p14="http://schemas.microsoft.com/office/powerpoint/2010/main" val="2862999676"/>
+        <p14:creationId xmlns:p14="http://schemas.microsoft.com/office/powerpoint/2010/main" val="4288314028"/>
       </p:ext>
     </p:extLst>
   </p:cSld>
@@ -37508,11 +37910,6 @@
               </a:rPr>
               <a:t>); </a:t>
             </a:r>
-            <a:endParaRPr lang="en-US" sz="3600" dirty="0">
-              <a:solidFill>
-                <a:schemeClr val="bg1"/>
-              </a:solidFill>
-            </a:endParaRPr>
           </a:p>
           <a:p>
             <a:pPr marL="571500" indent="-571500">

</xml_diff>